<commit_message>
mise à jour la partie introduction générale du mémoire de thèse v1.1
</commit_message>
<xml_diff>
--- a/intégralité du mémoire de thèse/figure/Introduction.pptx
+++ b/intégralité du mémoire de thèse/figure/Introduction.pptx
@@ -7,6 +7,7 @@
   <p:sldIdLst>
     <p:sldId id="256" r:id="rId2"/>
     <p:sldId id="257" r:id="rId3"/>
+    <p:sldId id="259" r:id="rId4"/>
   </p:sldIdLst>
   <p:sldSz cx="12192000" cy="6858000"/>
   <p:notesSz cx="6858000" cy="9144000"/>
@@ -244,7 +245,7 @@
           <a:p>
             <a:fld id="{0BE344A5-BB98-4635-BD37-A2AE9FFD580E}" type="datetimeFigureOut">
               <a:rPr lang="fr-FR" smtClean="0"/>
-              <a:t>09/01/2019</a:t>
+              <a:t>10/01/2019</a:t>
             </a:fld>
             <a:endParaRPr lang="fr-FR"/>
           </a:p>
@@ -414,7 +415,7 @@
           <a:p>
             <a:fld id="{0BE344A5-BB98-4635-BD37-A2AE9FFD580E}" type="datetimeFigureOut">
               <a:rPr lang="fr-FR" smtClean="0"/>
-              <a:t>09/01/2019</a:t>
+              <a:t>10/01/2019</a:t>
             </a:fld>
             <a:endParaRPr lang="fr-FR"/>
           </a:p>
@@ -594,7 +595,7 @@
           <a:p>
             <a:fld id="{0BE344A5-BB98-4635-BD37-A2AE9FFD580E}" type="datetimeFigureOut">
               <a:rPr lang="fr-FR" smtClean="0"/>
-              <a:t>09/01/2019</a:t>
+              <a:t>10/01/2019</a:t>
             </a:fld>
             <a:endParaRPr lang="fr-FR"/>
           </a:p>
@@ -764,7 +765,7 @@
           <a:p>
             <a:fld id="{0BE344A5-BB98-4635-BD37-A2AE9FFD580E}" type="datetimeFigureOut">
               <a:rPr lang="fr-FR" smtClean="0"/>
-              <a:t>09/01/2019</a:t>
+              <a:t>10/01/2019</a:t>
             </a:fld>
             <a:endParaRPr lang="fr-FR"/>
           </a:p>
@@ -1010,7 +1011,7 @@
           <a:p>
             <a:fld id="{0BE344A5-BB98-4635-BD37-A2AE9FFD580E}" type="datetimeFigureOut">
               <a:rPr lang="fr-FR" smtClean="0"/>
-              <a:t>09/01/2019</a:t>
+              <a:t>10/01/2019</a:t>
             </a:fld>
             <a:endParaRPr lang="fr-FR"/>
           </a:p>
@@ -1242,7 +1243,7 @@
           <a:p>
             <a:fld id="{0BE344A5-BB98-4635-BD37-A2AE9FFD580E}" type="datetimeFigureOut">
               <a:rPr lang="fr-FR" smtClean="0"/>
-              <a:t>09/01/2019</a:t>
+              <a:t>10/01/2019</a:t>
             </a:fld>
             <a:endParaRPr lang="fr-FR"/>
           </a:p>
@@ -1609,7 +1610,7 @@
           <a:p>
             <a:fld id="{0BE344A5-BB98-4635-BD37-A2AE9FFD580E}" type="datetimeFigureOut">
               <a:rPr lang="fr-FR" smtClean="0"/>
-              <a:t>09/01/2019</a:t>
+              <a:t>10/01/2019</a:t>
             </a:fld>
             <a:endParaRPr lang="fr-FR"/>
           </a:p>
@@ -1727,7 +1728,7 @@
           <a:p>
             <a:fld id="{0BE344A5-BB98-4635-BD37-A2AE9FFD580E}" type="datetimeFigureOut">
               <a:rPr lang="fr-FR" smtClean="0"/>
-              <a:t>09/01/2019</a:t>
+              <a:t>10/01/2019</a:t>
             </a:fld>
             <a:endParaRPr lang="fr-FR"/>
           </a:p>
@@ -1822,7 +1823,7 @@
           <a:p>
             <a:fld id="{0BE344A5-BB98-4635-BD37-A2AE9FFD580E}" type="datetimeFigureOut">
               <a:rPr lang="fr-FR" smtClean="0"/>
-              <a:t>09/01/2019</a:t>
+              <a:t>10/01/2019</a:t>
             </a:fld>
             <a:endParaRPr lang="fr-FR"/>
           </a:p>
@@ -2099,7 +2100,7 @@
           <a:p>
             <a:fld id="{0BE344A5-BB98-4635-BD37-A2AE9FFD580E}" type="datetimeFigureOut">
               <a:rPr lang="fr-FR" smtClean="0"/>
-              <a:t>09/01/2019</a:t>
+              <a:t>10/01/2019</a:t>
             </a:fld>
             <a:endParaRPr lang="fr-FR"/>
           </a:p>
@@ -2352,7 +2353,7 @@
           <a:p>
             <a:fld id="{0BE344A5-BB98-4635-BD37-A2AE9FFD580E}" type="datetimeFigureOut">
               <a:rPr lang="fr-FR" smtClean="0"/>
-              <a:t>09/01/2019</a:t>
+              <a:t>10/01/2019</a:t>
             </a:fld>
             <a:endParaRPr lang="fr-FR"/>
           </a:p>
@@ -2565,7 +2566,7 @@
           <a:p>
             <a:fld id="{0BE344A5-BB98-4635-BD37-A2AE9FFD580E}" type="datetimeFigureOut">
               <a:rPr lang="fr-FR" smtClean="0"/>
-              <a:t>09/01/2019</a:t>
+              <a:t>10/01/2019</a:t>
             </a:fld>
             <a:endParaRPr lang="fr-FR"/>
           </a:p>
@@ -3043,7 +3044,7 @@
             <p:nvPr/>
           </p:nvPicPr>
           <p:blipFill>
-            <a:blip r:embed="rId3">
+            <a:blip r:embed="rId2">
               <a:extLst>
                 <a:ext uri="{28A0092B-C50C-407E-A947-70E740481C1C}">
                   <a14:useLocalDpi xmlns:a14="http://schemas.microsoft.com/office/drawing/2010/main" val="0"/>
@@ -3528,6 +3529,1891 @@
 </p:sld>
 </file>
 
+<file path=ppt/slides/slide3.xml><?xml version="1.0" encoding="utf-8"?>
+<p:sld xmlns:a="http://schemas.openxmlformats.org/drawingml/2006/main" xmlns:r="http://schemas.openxmlformats.org/officeDocument/2006/relationships" xmlns:p="http://schemas.openxmlformats.org/presentationml/2006/main">
+  <p:cSld>
+    <p:spTree>
+      <p:nvGrpSpPr>
+        <p:cNvPr id="1" name=""/>
+        <p:cNvGrpSpPr/>
+        <p:nvPr/>
+      </p:nvGrpSpPr>
+      <p:grpSpPr>
+        <a:xfrm>
+          <a:off x="0" y="0"/>
+          <a:ext cx="0" cy="0"/>
+          <a:chOff x="0" y="0"/>
+          <a:chExt cx="0" cy="0"/>
+        </a:xfrm>
+      </p:grpSpPr>
+      <p:grpSp>
+        <p:nvGrpSpPr>
+          <p:cNvPr id="155" name="Groupe 154"/>
+          <p:cNvGrpSpPr/>
+          <p:nvPr/>
+        </p:nvGrpSpPr>
+        <p:grpSpPr>
+          <a:xfrm>
+            <a:off x="3428888" y="584514"/>
+            <a:ext cx="5266889" cy="3090241"/>
+            <a:chOff x="3428888" y="584514"/>
+            <a:chExt cx="5266889" cy="3090241"/>
+          </a:xfrm>
+        </p:grpSpPr>
+        <p:grpSp>
+          <p:nvGrpSpPr>
+            <p:cNvPr id="93" name="Groupe 92"/>
+            <p:cNvGrpSpPr/>
+            <p:nvPr/>
+          </p:nvGrpSpPr>
+          <p:grpSpPr>
+            <a:xfrm>
+              <a:off x="3992190" y="584514"/>
+              <a:ext cx="4703587" cy="3070620"/>
+              <a:chOff x="3992190" y="584514"/>
+              <a:chExt cx="4703587" cy="3070620"/>
+            </a:xfrm>
+          </p:grpSpPr>
+          <p:grpSp>
+            <p:nvGrpSpPr>
+              <p:cNvPr id="78" name="Groupe 77"/>
+              <p:cNvGrpSpPr/>
+              <p:nvPr/>
+            </p:nvGrpSpPr>
+            <p:grpSpPr>
+              <a:xfrm>
+                <a:off x="3992190" y="584514"/>
+                <a:ext cx="3295620" cy="3070620"/>
+                <a:chOff x="3020640" y="438464"/>
+                <a:chExt cx="3295620" cy="3070620"/>
+              </a:xfrm>
+            </p:grpSpPr>
+            <p:grpSp>
+              <p:nvGrpSpPr>
+                <p:cNvPr id="8" name="Groupe 7"/>
+                <p:cNvGrpSpPr/>
+                <p:nvPr/>
+              </p:nvGrpSpPr>
+              <p:grpSpPr>
+                <a:xfrm>
+                  <a:off x="3020640" y="787856"/>
+                  <a:ext cx="3295620" cy="2721228"/>
+                  <a:chOff x="4456016" y="2491161"/>
+                  <a:chExt cx="3295620" cy="2721228"/>
+                </a:xfrm>
+              </p:grpSpPr>
+              <p:grpSp>
+                <p:nvGrpSpPr>
+                  <p:cNvPr id="14" name="Groupe 13"/>
+                  <p:cNvGrpSpPr/>
+                  <p:nvPr/>
+                </p:nvGrpSpPr>
+                <p:grpSpPr>
+                  <a:xfrm>
+                    <a:off x="4622805" y="2532716"/>
+                    <a:ext cx="2935605" cy="2616200"/>
+                    <a:chOff x="0" y="0"/>
+                    <a:chExt cx="2935852" cy="2616283"/>
+                  </a:xfrm>
+                </p:grpSpPr>
+                <p:sp>
+                  <p:nvSpPr>
+                    <p:cNvPr id="41" name="Ellipse 40"/>
+                    <p:cNvSpPr/>
+                    <p:nvPr/>
+                  </p:nvSpPr>
+                  <p:spPr>
+                    <a:xfrm rot="19267261">
+                      <a:off x="138022" y="526211"/>
+                      <a:ext cx="2594234" cy="1510468"/>
+                    </a:xfrm>
+                    <a:prstGeom prst="ellipse">
+                      <a:avLst/>
+                    </a:prstGeom>
+                    <a:ln>
+                      <a:solidFill>
+                        <a:srgbClr val="0070C0"/>
+                      </a:solidFill>
+                      <a:prstDash val="dash"/>
+                    </a:ln>
+                  </p:spPr>
+                  <p:style>
+                    <a:lnRef idx="2">
+                      <a:schemeClr val="accent5"/>
+                    </a:lnRef>
+                    <a:fillRef idx="1">
+                      <a:schemeClr val="lt1"/>
+                    </a:fillRef>
+                    <a:effectRef idx="0">
+                      <a:schemeClr val="accent5"/>
+                    </a:effectRef>
+                    <a:fontRef idx="minor">
+                      <a:schemeClr val="dk1"/>
+                    </a:fontRef>
+                  </p:style>
+                  <p:txBody>
+                    <a:bodyPr rtlCol="0" anchor="ctr"/>
+                    <a:lstStyle/>
+                    <a:p>
+                      <a:endParaRPr lang="fr-FR"/>
+                    </a:p>
+                  </p:txBody>
+                </p:sp>
+                <p:grpSp>
+                  <p:nvGrpSpPr>
+                    <p:cNvPr id="42" name="Groupe 41"/>
+                    <p:cNvGrpSpPr/>
+                    <p:nvPr/>
+                  </p:nvGrpSpPr>
+                  <p:grpSpPr>
+                    <a:xfrm>
+                      <a:off x="1449237" y="1345720"/>
+                      <a:ext cx="977657" cy="977657"/>
+                      <a:chOff x="0" y="0"/>
+                      <a:chExt cx="977657" cy="977657"/>
+                    </a:xfrm>
+                  </p:grpSpPr>
+                  <p:sp>
+                    <p:nvSpPr>
+                      <p:cNvPr id="53" name="Ellipse 52"/>
+                      <p:cNvSpPr/>
+                      <p:nvPr/>
+                    </p:nvSpPr>
+                    <p:spPr>
+                      <a:xfrm rot="21385781">
+                        <a:off x="452102" y="442143"/>
+                        <a:ext cx="105193" cy="105193"/>
+                      </a:xfrm>
+                      <a:prstGeom prst="ellipse">
+                        <a:avLst/>
+                      </a:prstGeom>
+                      <a:solidFill>
+                        <a:schemeClr val="tx1"/>
+                      </a:solidFill>
+                      <a:ln>
+                        <a:solidFill>
+                          <a:schemeClr val="tx1"/>
+                        </a:solidFill>
+                      </a:ln>
+                    </p:spPr>
+                    <p:style>
+                      <a:lnRef idx="2">
+                        <a:schemeClr val="accent6">
+                          <a:shade val="50000"/>
+                        </a:schemeClr>
+                      </a:lnRef>
+                      <a:fillRef idx="1">
+                        <a:schemeClr val="accent6"/>
+                      </a:fillRef>
+                      <a:effectRef idx="0">
+                        <a:schemeClr val="accent6"/>
+                      </a:effectRef>
+                      <a:fontRef idx="minor">
+                        <a:schemeClr val="lt1"/>
+                      </a:fontRef>
+                    </p:style>
+                    <p:txBody>
+                      <a:bodyPr rtlCol="0" anchor="ctr"/>
+                      <a:lstStyle/>
+                      <a:p>
+                        <a:endParaRPr lang="fr-FR"/>
+                      </a:p>
+                    </p:txBody>
+                  </p:sp>
+                  <p:sp>
+                    <p:nvSpPr>
+                      <p:cNvPr id="54" name="Ellipse 53"/>
+                      <p:cNvSpPr/>
+                      <p:nvPr/>
+                    </p:nvSpPr>
+                    <p:spPr>
+                      <a:xfrm>
+                        <a:off x="0" y="0"/>
+                        <a:ext cx="977657" cy="977657"/>
+                      </a:xfrm>
+                      <a:prstGeom prst="ellipse">
+                        <a:avLst/>
+                      </a:prstGeom>
+                      <a:noFill/>
+                      <a:ln w="28575">
+                        <a:solidFill>
+                          <a:schemeClr val="tx1"/>
+                        </a:solidFill>
+                      </a:ln>
+                    </p:spPr>
+                    <p:style>
+                      <a:lnRef idx="2">
+                        <a:schemeClr val="accent1">
+                          <a:shade val="50000"/>
+                        </a:schemeClr>
+                      </a:lnRef>
+                      <a:fillRef idx="1">
+                        <a:schemeClr val="accent1"/>
+                      </a:fillRef>
+                      <a:effectRef idx="0">
+                        <a:schemeClr val="accent1"/>
+                      </a:effectRef>
+                      <a:fontRef idx="minor">
+                        <a:schemeClr val="lt1"/>
+                      </a:fontRef>
+                    </p:style>
+                    <p:txBody>
+                      <a:bodyPr rtlCol="0" anchor="ctr"/>
+                      <a:lstStyle/>
+                      <a:p>
+                        <a:endParaRPr lang="fr-FR"/>
+                      </a:p>
+                    </p:txBody>
+                  </p:sp>
+                </p:grpSp>
+                <p:grpSp>
+                  <p:nvGrpSpPr>
+                    <p:cNvPr id="43" name="Groupe 42"/>
+                    <p:cNvGrpSpPr/>
+                    <p:nvPr/>
+                  </p:nvGrpSpPr>
+                  <p:grpSpPr>
+                    <a:xfrm rot="10800000">
+                      <a:off x="362308" y="336430"/>
+                      <a:ext cx="977265" cy="977265"/>
+                      <a:chOff x="6825" y="34450"/>
+                      <a:chExt cx="977657" cy="977657"/>
+                    </a:xfrm>
+                  </p:grpSpPr>
+                  <p:sp>
+                    <p:nvSpPr>
+                      <p:cNvPr id="51" name="Ellipse 50"/>
+                      <p:cNvSpPr/>
+                      <p:nvPr/>
+                    </p:nvSpPr>
+                    <p:spPr>
+                      <a:xfrm rot="275613">
+                        <a:off x="6825" y="34450"/>
+                        <a:ext cx="977657" cy="977657"/>
+                      </a:xfrm>
+                      <a:prstGeom prst="ellipse">
+                        <a:avLst/>
+                      </a:prstGeom>
+                      <a:noFill/>
+                      <a:ln w="28575">
+                        <a:solidFill>
+                          <a:schemeClr val="tx1"/>
+                        </a:solidFill>
+                      </a:ln>
+                    </p:spPr>
+                    <p:style>
+                      <a:lnRef idx="2">
+                        <a:schemeClr val="accent1">
+                          <a:shade val="50000"/>
+                        </a:schemeClr>
+                      </a:lnRef>
+                      <a:fillRef idx="1">
+                        <a:schemeClr val="accent1"/>
+                      </a:fillRef>
+                      <a:effectRef idx="0">
+                        <a:schemeClr val="accent1"/>
+                      </a:effectRef>
+                      <a:fontRef idx="minor">
+                        <a:schemeClr val="lt1"/>
+                      </a:fontRef>
+                    </p:style>
+                    <p:txBody>
+                      <a:bodyPr rtlCol="0" anchor="ctr"/>
+                      <a:lstStyle/>
+                      <a:p>
+                        <a:endParaRPr lang="fr-FR"/>
+                      </a:p>
+                    </p:txBody>
+                  </p:sp>
+                  <p:sp>
+                    <p:nvSpPr>
+                      <p:cNvPr id="52" name="Ellipse 51"/>
+                      <p:cNvSpPr/>
+                      <p:nvPr/>
+                    </p:nvSpPr>
+                    <p:spPr>
+                      <a:xfrm rot="21385781">
+                        <a:off x="466924" y="474930"/>
+                        <a:ext cx="105193" cy="105193"/>
+                      </a:xfrm>
+                      <a:prstGeom prst="ellipse">
+                        <a:avLst/>
+                      </a:prstGeom>
+                      <a:ln/>
+                    </p:spPr>
+                    <p:style>
+                      <a:lnRef idx="2">
+                        <a:schemeClr val="dk1">
+                          <a:shade val="50000"/>
+                        </a:schemeClr>
+                      </a:lnRef>
+                      <a:fillRef idx="1">
+                        <a:schemeClr val="dk1"/>
+                      </a:fillRef>
+                      <a:effectRef idx="0">
+                        <a:schemeClr val="dk1"/>
+                      </a:effectRef>
+                      <a:fontRef idx="minor">
+                        <a:schemeClr val="lt1"/>
+                      </a:fontRef>
+                    </p:style>
+                    <p:txBody>
+                      <a:bodyPr rtlCol="0" anchor="ctr"/>
+                      <a:lstStyle/>
+                      <a:p>
+                        <a:endParaRPr lang="fr-FR"/>
+                      </a:p>
+                    </p:txBody>
+                  </p:sp>
+                </p:grpSp>
+                <p:grpSp>
+                  <p:nvGrpSpPr>
+                    <p:cNvPr id="44" name="Groupe 43"/>
+                    <p:cNvGrpSpPr/>
+                    <p:nvPr/>
+                  </p:nvGrpSpPr>
+                  <p:grpSpPr>
+                    <a:xfrm rot="5979733">
+                      <a:off x="0" y="1639018"/>
+                      <a:ext cx="977265" cy="977265"/>
+                      <a:chOff x="0" y="0"/>
+                      <a:chExt cx="977657" cy="977657"/>
+                    </a:xfrm>
+                  </p:grpSpPr>
+                  <p:sp>
+                    <p:nvSpPr>
+                      <p:cNvPr id="49" name="Ellipse 48"/>
+                      <p:cNvSpPr/>
+                      <p:nvPr/>
+                    </p:nvSpPr>
+                    <p:spPr>
+                      <a:xfrm>
+                        <a:off x="0" y="0"/>
+                        <a:ext cx="977657" cy="977657"/>
+                      </a:xfrm>
+                      <a:prstGeom prst="ellipse">
+                        <a:avLst/>
+                      </a:prstGeom>
+                      <a:noFill/>
+                      <a:ln w="28575">
+                        <a:solidFill>
+                          <a:schemeClr val="tx1"/>
+                        </a:solidFill>
+                      </a:ln>
+                    </p:spPr>
+                    <p:style>
+                      <a:lnRef idx="2">
+                        <a:schemeClr val="accent1">
+                          <a:shade val="50000"/>
+                        </a:schemeClr>
+                      </a:lnRef>
+                      <a:fillRef idx="1">
+                        <a:schemeClr val="accent1"/>
+                      </a:fillRef>
+                      <a:effectRef idx="0">
+                        <a:schemeClr val="accent1"/>
+                      </a:effectRef>
+                      <a:fontRef idx="minor">
+                        <a:schemeClr val="lt1"/>
+                      </a:fontRef>
+                    </p:style>
+                    <p:txBody>
+                      <a:bodyPr rtlCol="0" anchor="ctr"/>
+                      <a:lstStyle/>
+                      <a:p>
+                        <a:endParaRPr lang="fr-FR"/>
+                      </a:p>
+                    </p:txBody>
+                  </p:sp>
+                  <p:sp>
+                    <p:nvSpPr>
+                      <p:cNvPr id="50" name="Ellipse 49"/>
+                      <p:cNvSpPr/>
+                      <p:nvPr/>
+                    </p:nvSpPr>
+                    <p:spPr>
+                      <a:xfrm rot="21385781">
+                        <a:off x="452102" y="442143"/>
+                        <a:ext cx="105193" cy="105193"/>
+                      </a:xfrm>
+                      <a:prstGeom prst="ellipse">
+                        <a:avLst/>
+                      </a:prstGeom>
+                      <a:solidFill>
+                        <a:schemeClr val="tx1"/>
+                      </a:solidFill>
+                      <a:ln>
+                        <a:solidFill>
+                          <a:schemeClr val="tx1"/>
+                        </a:solidFill>
+                      </a:ln>
+                    </p:spPr>
+                    <p:style>
+                      <a:lnRef idx="2">
+                        <a:schemeClr val="accent6">
+                          <a:shade val="50000"/>
+                        </a:schemeClr>
+                      </a:lnRef>
+                      <a:fillRef idx="1">
+                        <a:schemeClr val="accent6"/>
+                      </a:fillRef>
+                      <a:effectRef idx="0">
+                        <a:schemeClr val="accent6"/>
+                      </a:effectRef>
+                      <a:fontRef idx="minor">
+                        <a:schemeClr val="lt1"/>
+                      </a:fontRef>
+                    </p:style>
+                    <p:txBody>
+                      <a:bodyPr rtlCol="0" anchor="ctr"/>
+                      <a:lstStyle/>
+                      <a:p>
+                        <a:endParaRPr lang="fr-FR"/>
+                      </a:p>
+                    </p:txBody>
+                  </p:sp>
+                </p:grpSp>
+                <p:grpSp>
+                  <p:nvGrpSpPr>
+                    <p:cNvPr id="45" name="Groupe 44"/>
+                    <p:cNvGrpSpPr/>
+                    <p:nvPr/>
+                  </p:nvGrpSpPr>
+                  <p:grpSpPr>
+                    <a:xfrm rot="17078365">
+                      <a:off x="1958195" y="0"/>
+                      <a:ext cx="977657" cy="977657"/>
+                      <a:chOff x="0" y="0"/>
+                      <a:chExt cx="977657" cy="977657"/>
+                    </a:xfrm>
+                  </p:grpSpPr>
+                  <p:sp>
+                    <p:nvSpPr>
+                      <p:cNvPr id="46" name="Ellipse 45"/>
+                      <p:cNvSpPr/>
+                      <p:nvPr/>
+                    </p:nvSpPr>
+                    <p:spPr>
+                      <a:xfrm>
+                        <a:off x="0" y="0"/>
+                        <a:ext cx="977657" cy="977657"/>
+                      </a:xfrm>
+                      <a:prstGeom prst="ellipse">
+                        <a:avLst/>
+                      </a:prstGeom>
+                      <a:noFill/>
+                      <a:ln w="28575">
+                        <a:solidFill>
+                          <a:schemeClr val="tx1"/>
+                        </a:solidFill>
+                      </a:ln>
+                    </p:spPr>
+                    <p:style>
+                      <a:lnRef idx="2">
+                        <a:schemeClr val="accent1">
+                          <a:shade val="50000"/>
+                        </a:schemeClr>
+                      </a:lnRef>
+                      <a:fillRef idx="1">
+                        <a:schemeClr val="accent1"/>
+                      </a:fillRef>
+                      <a:effectRef idx="0">
+                        <a:schemeClr val="accent1"/>
+                      </a:effectRef>
+                      <a:fontRef idx="minor">
+                        <a:schemeClr val="lt1"/>
+                      </a:fontRef>
+                    </p:style>
+                    <p:txBody>
+                      <a:bodyPr rtlCol="0" anchor="ctr"/>
+                      <a:lstStyle/>
+                      <a:p>
+                        <a:endParaRPr lang="fr-FR"/>
+                      </a:p>
+                    </p:txBody>
+                  </p:sp>
+                  <p:sp>
+                    <p:nvSpPr>
+                      <p:cNvPr id="47" name="Ellipse 46"/>
+                      <p:cNvSpPr/>
+                      <p:nvPr/>
+                    </p:nvSpPr>
+                    <p:spPr>
+                      <a:xfrm rot="21385781">
+                        <a:off x="452102" y="442143"/>
+                        <a:ext cx="105193" cy="105193"/>
+                      </a:xfrm>
+                      <a:prstGeom prst="ellipse">
+                        <a:avLst/>
+                      </a:prstGeom>
+                      <a:ln/>
+                    </p:spPr>
+                    <p:style>
+                      <a:lnRef idx="2">
+                        <a:schemeClr val="dk1">
+                          <a:shade val="50000"/>
+                        </a:schemeClr>
+                      </a:lnRef>
+                      <a:fillRef idx="1">
+                        <a:schemeClr val="dk1"/>
+                      </a:fillRef>
+                      <a:effectRef idx="0">
+                        <a:schemeClr val="dk1"/>
+                      </a:effectRef>
+                      <a:fontRef idx="minor">
+                        <a:schemeClr val="lt1"/>
+                      </a:fontRef>
+                    </p:style>
+                    <p:txBody>
+                      <a:bodyPr rtlCol="0" anchor="ctr"/>
+                      <a:lstStyle/>
+                      <a:p>
+                        <a:endParaRPr lang="fr-FR"/>
+                      </a:p>
+                    </p:txBody>
+                  </p:sp>
+                </p:grpSp>
+              </p:grpSp>
+              <p:cxnSp>
+                <p:nvCxnSpPr>
+                  <p:cNvPr id="38" name="Connecteur droit avec flèche 37"/>
+                  <p:cNvCxnSpPr/>
+                  <p:nvPr/>
+                </p:nvCxnSpPr>
+                <p:spPr>
+                  <a:xfrm flipV="1">
+                    <a:off x="7079443" y="2491161"/>
+                    <a:ext cx="672193" cy="509619"/>
+                  </a:xfrm>
+                  <a:prstGeom prst="straightConnector1">
+                    <a:avLst/>
+                  </a:prstGeom>
+                  <a:ln w="28575">
+                    <a:solidFill>
+                      <a:schemeClr val="tx1"/>
+                    </a:solidFill>
+                    <a:tailEnd type="triangle"/>
+                  </a:ln>
+                </p:spPr>
+                <p:style>
+                  <a:lnRef idx="1">
+                    <a:schemeClr val="accent1"/>
+                  </a:lnRef>
+                  <a:fillRef idx="0">
+                    <a:schemeClr val="accent1"/>
+                  </a:fillRef>
+                  <a:effectRef idx="0">
+                    <a:schemeClr val="accent1"/>
+                  </a:effectRef>
+                  <a:fontRef idx="minor">
+                    <a:schemeClr val="tx1"/>
+                  </a:fontRef>
+                </p:style>
+              </p:cxnSp>
+              <p:cxnSp>
+                <p:nvCxnSpPr>
+                  <p:cNvPr id="34" name="Connecteur droit avec flèche 33"/>
+                  <p:cNvCxnSpPr/>
+                  <p:nvPr/>
+                </p:nvCxnSpPr>
+                <p:spPr>
+                  <a:xfrm rot="15655546" flipV="1">
+                    <a:off x="4802951" y="2803902"/>
+                    <a:ext cx="672193" cy="509619"/>
+                  </a:xfrm>
+                  <a:prstGeom prst="straightConnector1">
+                    <a:avLst/>
+                  </a:prstGeom>
+                  <a:ln w="28575">
+                    <a:solidFill>
+                      <a:schemeClr val="tx1"/>
+                    </a:solidFill>
+                    <a:tailEnd type="triangle"/>
+                  </a:ln>
+                </p:spPr>
+                <p:style>
+                  <a:lnRef idx="1">
+                    <a:schemeClr val="accent1"/>
+                  </a:lnRef>
+                  <a:fillRef idx="0">
+                    <a:schemeClr val="accent1"/>
+                  </a:fillRef>
+                  <a:effectRef idx="0">
+                    <a:schemeClr val="accent1"/>
+                  </a:effectRef>
+                  <a:fontRef idx="minor">
+                    <a:schemeClr val="tx1"/>
+                  </a:fontRef>
+                </p:style>
+              </p:cxnSp>
+              <p:cxnSp>
+                <p:nvCxnSpPr>
+                  <p:cNvPr id="28" name="Connecteur droit avec flèche 27"/>
+                  <p:cNvCxnSpPr/>
+                  <p:nvPr/>
+                </p:nvCxnSpPr>
+                <p:spPr>
+                  <a:xfrm rot="10489501" flipV="1">
+                    <a:off x="4456016" y="4702770"/>
+                    <a:ext cx="672193" cy="509619"/>
+                  </a:xfrm>
+                  <a:prstGeom prst="straightConnector1">
+                    <a:avLst/>
+                  </a:prstGeom>
+                  <a:ln w="28575">
+                    <a:solidFill>
+                      <a:schemeClr val="tx1"/>
+                    </a:solidFill>
+                    <a:tailEnd type="triangle"/>
+                  </a:ln>
+                </p:spPr>
+                <p:style>
+                  <a:lnRef idx="1">
+                    <a:schemeClr val="accent1"/>
+                  </a:lnRef>
+                  <a:fillRef idx="0">
+                    <a:schemeClr val="accent1"/>
+                  </a:fillRef>
+                  <a:effectRef idx="0">
+                    <a:schemeClr val="accent1"/>
+                  </a:effectRef>
+                  <a:fontRef idx="minor">
+                    <a:schemeClr val="tx1"/>
+                  </a:fontRef>
+                </p:style>
+              </p:cxnSp>
+              <p:cxnSp>
+                <p:nvCxnSpPr>
+                  <p:cNvPr id="22" name="Connecteur droit avec flèche 21"/>
+                  <p:cNvCxnSpPr>
+                    <a:endCxn id="142" idx="0"/>
+                  </p:cNvCxnSpPr>
+                  <p:nvPr/>
+                </p:nvCxnSpPr>
+                <p:spPr>
+                  <a:xfrm>
+                    <a:off x="6581753" y="4386811"/>
+                    <a:ext cx="452914" cy="544685"/>
+                  </a:xfrm>
+                  <a:prstGeom prst="straightConnector1">
+                    <a:avLst/>
+                  </a:prstGeom>
+                  <a:ln w="28575">
+                    <a:solidFill>
+                      <a:schemeClr val="tx1"/>
+                    </a:solidFill>
+                    <a:tailEnd type="triangle"/>
+                  </a:ln>
+                </p:spPr>
+                <p:style>
+                  <a:lnRef idx="1">
+                    <a:schemeClr val="accent1"/>
+                  </a:lnRef>
+                  <a:fillRef idx="0">
+                    <a:schemeClr val="accent1"/>
+                  </a:fillRef>
+                  <a:effectRef idx="0">
+                    <a:schemeClr val="accent1"/>
+                  </a:effectRef>
+                  <a:fontRef idx="minor">
+                    <a:schemeClr val="tx1"/>
+                  </a:fontRef>
+                </p:style>
+              </p:cxnSp>
+            </p:grpSp>
+            <p:sp>
+              <p:nvSpPr>
+                <p:cNvPr id="69" name="Arc 68"/>
+                <p:cNvSpPr/>
+                <p:nvPr/>
+              </p:nvSpPr>
+              <p:spPr>
+                <a:xfrm rot="15331451">
+                  <a:off x="5270052" y="842370"/>
+                  <a:ext cx="876631" cy="622161"/>
+                </a:xfrm>
+                <a:prstGeom prst="arc">
+                  <a:avLst>
+                    <a:gd name="adj1" fmla="val 21162138"/>
+                    <a:gd name="adj2" fmla="val 1295915"/>
+                  </a:avLst>
+                </a:prstGeom>
+                <a:ln>
+                  <a:solidFill>
+                    <a:schemeClr val="tx1"/>
+                  </a:solidFill>
+                  <a:headEnd type="arrow" w="med" len="med"/>
+                  <a:tailEnd type="none" w="med" len="med"/>
+                </a:ln>
+              </p:spPr>
+              <p:style>
+                <a:lnRef idx="1">
+                  <a:schemeClr val="accent1"/>
+                </a:lnRef>
+                <a:fillRef idx="0">
+                  <a:schemeClr val="accent1"/>
+                </a:fillRef>
+                <a:effectRef idx="0">
+                  <a:schemeClr val="accent1"/>
+                </a:effectRef>
+                <a:fontRef idx="minor">
+                  <a:schemeClr val="tx1"/>
+                </a:fontRef>
+              </p:style>
+              <p:txBody>
+                <a:bodyPr rtlCol="0" anchor="ctr"/>
+                <a:lstStyle/>
+                <a:p>
+                  <a:pPr algn="ctr"/>
+                  <a:endParaRPr lang="fr-FR"/>
+                </a:p>
+              </p:txBody>
+            </p:sp>
+            <mc:AlternateContent xmlns:mc="http://schemas.openxmlformats.org/markup-compatibility/2006">
+              <mc:Choice xmlns:a14="http://schemas.microsoft.com/office/drawing/2010/main" Requires="a14">
+                <p:sp>
+                  <p:nvSpPr>
+                    <p:cNvPr id="70" name="ZoneTexte 69"/>
+                    <p:cNvSpPr txBox="1"/>
+                    <p:nvPr/>
+                  </p:nvSpPr>
+                  <p:spPr>
+                    <a:xfrm>
+                      <a:off x="5620624" y="438464"/>
+                      <a:ext cx="378235" cy="302840"/>
+                    </a:xfrm>
+                    <a:prstGeom prst="rect">
+                      <a:avLst/>
+                    </a:prstGeom>
+                    <a:noFill/>
+                  </p:spPr>
+                  <p:txBody>
+                    <a:bodyPr wrap="square" rtlCol="0">
+                      <a:spAutoFit/>
+                    </a:bodyPr>
+                    <a:lstStyle/>
+                    <a:p>
+                      <a:pPr algn="ctr"/>
+                      <a14:m>
+                        <m:oMathPara xmlns:m="http://schemas.openxmlformats.org/officeDocument/2006/math">
+                          <m:oMathParaPr>
+                            <m:jc m:val="centerGroup"/>
+                          </m:oMathParaPr>
+                          <m:oMath xmlns:m="http://schemas.openxmlformats.org/officeDocument/2006/math">
+                            <m:r>
+                              <a:rPr lang="fr-FR" sz="1400" b="0" i="1" baseline="-25000" smtClean="0">
+                                <a:latin typeface="Cambria Math" panose="02040503050406030204" pitchFamily="18" charset="0"/>
+                              </a:rPr>
+                              <m:t>𝛺</m:t>
+                            </m:r>
+                          </m:oMath>
+                        </m:oMathPara>
+                      </a14:m>
+                      <a:endParaRPr lang="fr-FR" sz="1400" i="1" baseline="-25000" dirty="0"/>
+                    </a:p>
+                  </p:txBody>
+                </p:sp>
+              </mc:Choice>
+              <mc:Fallback>
+                <p:sp>
+                  <p:nvSpPr>
+                    <p:cNvPr id="70" name="ZoneTexte 69"/>
+                    <p:cNvSpPr txBox="1">
+                      <a:spLocks noRot="1" noChangeAspect="1" noMove="1" noResize="1" noEditPoints="1" noAdjustHandles="1" noChangeArrowheads="1" noChangeShapeType="1" noTextEdit="1"/>
+                    </p:cNvSpPr>
+                    <p:nvPr/>
+                  </p:nvSpPr>
+                  <p:spPr>
+                    <a:xfrm>
+                      <a:off x="5620624" y="438464"/>
+                      <a:ext cx="378235" cy="302840"/>
+                    </a:xfrm>
+                    <a:prstGeom prst="rect">
+                      <a:avLst/>
+                    </a:prstGeom>
+                    <a:blipFill rotWithShape="0">
+                      <a:blip r:embed="rId2"/>
+                      <a:stretch>
+                        <a:fillRect/>
+                      </a:stretch>
+                    </a:blipFill>
+                  </p:spPr>
+                  <p:txBody>
+                    <a:bodyPr/>
+                    <a:lstStyle/>
+                    <a:p>
+                      <a:r>
+                        <a:rPr lang="fr-FR">
+                          <a:noFill/>
+                        </a:rPr>
+                        <a:t> </a:t>
+                      </a:r>
+                    </a:p>
+                  </p:txBody>
+                </p:sp>
+              </mc:Fallback>
+            </mc:AlternateContent>
+            <p:sp>
+              <p:nvSpPr>
+                <p:cNvPr id="71" name="ZoneTexte 70"/>
+                <p:cNvSpPr txBox="1"/>
+                <p:nvPr/>
+              </p:nvSpPr>
+              <p:spPr>
+                <a:xfrm>
+                  <a:off x="5192097" y="1858588"/>
+                  <a:ext cx="504056" cy="235962"/>
+                </a:xfrm>
+                <a:prstGeom prst="rect">
+                  <a:avLst/>
+                </a:prstGeom>
+                <a:noFill/>
+              </p:spPr>
+              <p:txBody>
+                <a:bodyPr wrap="square" rtlCol="0">
+                  <a:spAutoFit/>
+                </a:bodyPr>
+                <a:lstStyle/>
+                <a:p>
+                  <a:pPr algn="ctr"/>
+                  <a:r>
+                    <a:rPr lang="fr-FR" sz="1400" i="1" baseline="-25000" dirty="0">
+                      <a:solidFill>
+                        <a:srgbClr val="0070C0"/>
+                      </a:solidFill>
+                    </a:rPr>
+                    <a:t>Ω</a:t>
+                  </a:r>
+                </a:p>
+              </p:txBody>
+            </p:sp>
+            <p:cxnSp>
+              <p:nvCxnSpPr>
+                <p:cNvPr id="74" name="Connecteur droit avec flèche 73"/>
+                <p:cNvCxnSpPr>
+                  <a:endCxn id="41" idx="5"/>
+                </p:cNvCxnSpPr>
+                <p:nvPr/>
+              </p:nvCxnSpPr>
+              <p:spPr>
+                <a:xfrm flipV="1">
+                  <a:off x="5551522" y="1950873"/>
+                  <a:ext cx="120069" cy="224215"/>
+                </a:xfrm>
+                <a:prstGeom prst="straightConnector1">
+                  <a:avLst/>
+                </a:prstGeom>
+                <a:ln w="28575">
+                  <a:solidFill>
+                    <a:srgbClr val="0070C0"/>
+                  </a:solidFill>
+                  <a:tailEnd type="arrow"/>
+                </a:ln>
+              </p:spPr>
+              <p:style>
+                <a:lnRef idx="1">
+                  <a:schemeClr val="accent1"/>
+                </a:lnRef>
+                <a:fillRef idx="0">
+                  <a:schemeClr val="accent1"/>
+                </a:fillRef>
+                <a:effectRef idx="0">
+                  <a:schemeClr val="accent1"/>
+                </a:effectRef>
+                <a:fontRef idx="minor">
+                  <a:schemeClr val="tx1"/>
+                </a:fontRef>
+              </p:style>
+            </p:cxnSp>
+          </p:grpSp>
+          <p:sp>
+            <p:nvSpPr>
+              <p:cNvPr id="79" name="ZoneTexte 78"/>
+              <p:cNvSpPr txBox="1"/>
+              <p:nvPr/>
+            </p:nvSpPr>
+            <p:spPr>
+              <a:xfrm>
+                <a:off x="7793520" y="1512128"/>
+                <a:ext cx="876445" cy="307777"/>
+              </a:xfrm>
+              <a:prstGeom prst="rect">
+                <a:avLst/>
+              </a:prstGeom>
+              <a:noFill/>
+            </p:spPr>
+            <p:txBody>
+              <a:bodyPr wrap="square" rtlCol="0">
+                <a:spAutoFit/>
+              </a:bodyPr>
+              <a:lstStyle/>
+              <a:p>
+                <a:pPr algn="ctr"/>
+                <a:r>
+                  <a:rPr lang="fr-FR" sz="1400" dirty="0" smtClean="0"/>
+                  <a:t>Rotor</a:t>
+                </a:r>
+                <a:endParaRPr lang="fr-FR" sz="1400" dirty="0"/>
+              </a:p>
+            </p:txBody>
+          </p:sp>
+          <p:cxnSp>
+            <p:nvCxnSpPr>
+              <p:cNvPr id="81" name="Connecteur en arc 80"/>
+              <p:cNvCxnSpPr>
+                <a:stCxn id="79" idx="1"/>
+              </p:cNvCxnSpPr>
+              <p:nvPr/>
+            </p:nvCxnSpPr>
+            <p:spPr>
+              <a:xfrm rot="10800000">
+                <a:off x="7154232" y="1501457"/>
+                <a:ext cx="639288" cy="164561"/>
+              </a:xfrm>
+              <a:prstGeom prst="curvedConnector3">
+                <a:avLst/>
+              </a:prstGeom>
+              <a:ln>
+                <a:tailEnd type="triangle"/>
+              </a:ln>
+            </p:spPr>
+            <p:style>
+              <a:lnRef idx="1">
+                <a:schemeClr val="dk1"/>
+              </a:lnRef>
+              <a:fillRef idx="0">
+                <a:schemeClr val="dk1"/>
+              </a:fillRef>
+              <a:effectRef idx="0">
+                <a:schemeClr val="dk1"/>
+              </a:effectRef>
+              <a:fontRef idx="minor">
+                <a:schemeClr val="tx1"/>
+              </a:fontRef>
+            </p:style>
+          </p:cxnSp>
+          <p:sp>
+            <p:nvSpPr>
+              <p:cNvPr id="82" name="ZoneTexte 81"/>
+              <p:cNvSpPr txBox="1"/>
+              <p:nvPr/>
+            </p:nvSpPr>
+            <p:spPr>
+              <a:xfrm>
+                <a:off x="7109713" y="2365411"/>
+                <a:ext cx="1586064" cy="523220"/>
+              </a:xfrm>
+              <a:prstGeom prst="rect">
+                <a:avLst/>
+              </a:prstGeom>
+              <a:noFill/>
+            </p:spPr>
+            <p:txBody>
+              <a:bodyPr wrap="square" rtlCol="0">
+                <a:spAutoFit/>
+              </a:bodyPr>
+              <a:lstStyle/>
+              <a:p>
+                <a:pPr algn="ctr"/>
+                <a:r>
+                  <a:rPr lang="fr-FR" sz="1400" dirty="0" smtClean="0">
+                    <a:solidFill>
+                      <a:srgbClr val="0070C0"/>
+                    </a:solidFill>
+                  </a:rPr>
+                  <a:t>Trajectoire </a:t>
+                </a:r>
+              </a:p>
+              <a:p>
+                <a:pPr algn="ctr"/>
+                <a:r>
+                  <a:rPr lang="fr-FR" sz="1400" dirty="0" smtClean="0">
+                    <a:solidFill>
+                      <a:srgbClr val="0070C0"/>
+                    </a:solidFill>
+                  </a:rPr>
+                  <a:t>(orbite synchrone)</a:t>
+                </a:r>
+                <a:endParaRPr lang="fr-FR" sz="1400" dirty="0">
+                  <a:solidFill>
+                    <a:srgbClr val="0070C0"/>
+                  </a:solidFill>
+                </a:endParaRPr>
+              </a:p>
+            </p:txBody>
+          </p:sp>
+          <p:cxnSp>
+            <p:nvCxnSpPr>
+              <p:cNvPr id="92" name="Connecteur en arc 91"/>
+              <p:cNvCxnSpPr>
+                <a:stCxn id="82" idx="1"/>
+              </p:cNvCxnSpPr>
+              <p:nvPr/>
+            </p:nvCxnSpPr>
+            <p:spPr>
+              <a:xfrm rot="10800000">
+                <a:off x="6692265" y="2060753"/>
+                <a:ext cx="417449" cy="566268"/>
+              </a:xfrm>
+              <a:prstGeom prst="curvedConnector2">
+                <a:avLst/>
+              </a:prstGeom>
+              <a:ln>
+                <a:solidFill>
+                  <a:srgbClr val="0070C0"/>
+                </a:solidFill>
+                <a:tailEnd type="triangle"/>
+              </a:ln>
+            </p:spPr>
+            <p:style>
+              <a:lnRef idx="1">
+                <a:schemeClr val="accent1"/>
+              </a:lnRef>
+              <a:fillRef idx="0">
+                <a:schemeClr val="accent1"/>
+              </a:fillRef>
+              <a:effectRef idx="0">
+                <a:schemeClr val="accent1"/>
+              </a:effectRef>
+              <a:fontRef idx="minor">
+                <a:schemeClr val="tx1"/>
+              </a:fontRef>
+            </p:style>
+          </p:cxnSp>
+        </p:grpSp>
+        <mc:AlternateContent xmlns:mc="http://schemas.openxmlformats.org/markup-compatibility/2006">
+          <mc:Choice xmlns:a14="http://schemas.microsoft.com/office/drawing/2010/main" Requires="a14">
+            <p:sp>
+              <p:nvSpPr>
+                <p:cNvPr id="140" name="Zone de texte 230"/>
+                <p:cNvSpPr txBox="1"/>
+                <p:nvPr/>
+              </p:nvSpPr>
+              <p:spPr>
+                <a:xfrm>
+                  <a:off x="4077452" y="1109454"/>
+                  <a:ext cx="301613" cy="274431"/>
+                </a:xfrm>
+                <a:prstGeom prst="rect">
+                  <a:avLst/>
+                </a:prstGeom>
+                <a:noFill/>
+                <a:ln w="6350">
+                  <a:noFill/>
+                </a:ln>
+                <a:effectLst/>
+              </p:spPr>
+              <p:style>
+                <a:lnRef idx="0">
+                  <a:schemeClr val="accent1"/>
+                </a:lnRef>
+                <a:fillRef idx="0">
+                  <a:schemeClr val="accent1"/>
+                </a:fillRef>
+                <a:effectRef idx="0">
+                  <a:schemeClr val="accent1"/>
+                </a:effectRef>
+                <a:fontRef idx="minor">
+                  <a:schemeClr val="dk1"/>
+                </a:fontRef>
+              </p:style>
+              <p:txBody>
+                <a:bodyPr rot="0" spcFirstLastPara="0" vert="horz" wrap="square" lIns="91440" tIns="45720" rIns="91440" bIns="45720" numCol="1" spcCol="0" rtlCol="0" fromWordArt="0" anchor="t" anchorCtr="0" forceAA="0" compatLnSpc="1">
+                  <a:prstTxWarp prst="textNoShape">
+                    <a:avLst/>
+                  </a:prstTxWarp>
+                  <a:noAutofit/>
+                </a:bodyPr>
+                <a:lstStyle/>
+                <a:p>
+                  <a:pPr>
+                    <a:lnSpc>
+                      <a:spcPct val="107000"/>
+                    </a:lnSpc>
+                    <a:spcAft>
+                      <a:spcPts val="800"/>
+                    </a:spcAft>
+                  </a:pPr>
+                  <a14:m>
+                    <m:oMathPara xmlns:m="http://schemas.openxmlformats.org/officeDocument/2006/math">
+                      <m:oMathParaPr>
+                        <m:jc m:val="centerGroup"/>
+                      </m:oMathParaPr>
+                      <m:oMath xmlns:m="http://schemas.openxmlformats.org/officeDocument/2006/math">
+                        <m:sSub>
+                          <m:sSubPr>
+                            <m:ctrlPr>
+                              <a:rPr lang="fr-FR" sz="1100" b="0" i="1" smtClean="0">
+                                <a:effectLst/>
+                                <a:latin typeface="Cambria Math" panose="02040503050406030204" pitchFamily="18" charset="0"/>
+                                <a:ea typeface="SimSun" panose="02010600030101010101" pitchFamily="2" charset="-122"/>
+                                <a:cs typeface="Times New Roman" panose="02020603050405020304" pitchFamily="18" charset="0"/>
+                              </a:rPr>
+                            </m:ctrlPr>
+                          </m:sSubPr>
+                          <m:e>
+                            <m:r>
+                              <a:rPr lang="fr-FR" sz="1100" b="0" i="1" smtClean="0">
+                                <a:effectLst/>
+                                <a:latin typeface="Cambria Math" panose="02040503050406030204" pitchFamily="18" charset="0"/>
+                                <a:ea typeface="SimSun" panose="02010600030101010101" pitchFamily="2" charset="-122"/>
+                                <a:cs typeface="Times New Roman" panose="02020603050405020304" pitchFamily="18" charset="0"/>
+                              </a:rPr>
+                              <m:t>𝐹</m:t>
+                            </m:r>
+                          </m:e>
+                          <m:sub>
+                            <m:r>
+                              <a:rPr lang="fr-FR" sz="1100" b="0" i="1" smtClean="0">
+                                <a:effectLst/>
+                                <a:latin typeface="Cambria Math" panose="02040503050406030204" pitchFamily="18" charset="0"/>
+                                <a:ea typeface="SimSun" panose="02010600030101010101" pitchFamily="2" charset="-122"/>
+                                <a:cs typeface="Times New Roman" panose="02020603050405020304" pitchFamily="18" charset="0"/>
+                              </a:rPr>
+                              <m:t>𝑈</m:t>
+                            </m:r>
+                          </m:sub>
+                        </m:sSub>
+                      </m:oMath>
+                    </m:oMathPara>
+                  </a14:m>
+                  <a:endParaRPr lang="fr-FR" sz="1100" dirty="0">
+                    <a:effectLst/>
+                    <a:ea typeface="SimSun" panose="02010600030101010101" pitchFamily="2" charset="-122"/>
+                    <a:cs typeface="Times New Roman" panose="02020603050405020304" pitchFamily="18" charset="0"/>
+                  </a:endParaRPr>
+                </a:p>
+              </p:txBody>
+            </p:sp>
+          </mc:Choice>
+          <mc:Fallback>
+            <p:sp>
+              <p:nvSpPr>
+                <p:cNvPr id="140" name="Zone de texte 230"/>
+                <p:cNvSpPr txBox="1">
+                  <a:spLocks noRot="1" noChangeAspect="1" noMove="1" noResize="1" noEditPoints="1" noAdjustHandles="1" noChangeArrowheads="1" noChangeShapeType="1" noTextEdit="1"/>
+                </p:cNvSpPr>
+                <p:nvPr/>
+              </p:nvSpPr>
+              <p:spPr>
+                <a:xfrm>
+                  <a:off x="4077452" y="1109454"/>
+                  <a:ext cx="301613" cy="274431"/>
+                </a:xfrm>
+                <a:prstGeom prst="rect">
+                  <a:avLst/>
+                </a:prstGeom>
+                <a:blipFill rotWithShape="0">
+                  <a:blip r:embed="rId3"/>
+                  <a:stretch>
+                    <a:fillRect/>
+                  </a:stretch>
+                </a:blipFill>
+                <a:ln w="6350">
+                  <a:noFill/>
+                </a:ln>
+                <a:effectLst/>
+              </p:spPr>
+              <p:txBody>
+                <a:bodyPr/>
+                <a:lstStyle/>
+                <a:p>
+                  <a:r>
+                    <a:rPr lang="fr-FR">
+                      <a:noFill/>
+                    </a:rPr>
+                    <a:t> </a:t>
+                  </a:r>
+                </a:p>
+              </p:txBody>
+            </p:sp>
+          </mc:Fallback>
+        </mc:AlternateContent>
+        <mc:AlternateContent xmlns:mc="http://schemas.openxmlformats.org/markup-compatibility/2006">
+          <mc:Choice xmlns:a14="http://schemas.microsoft.com/office/drawing/2010/main" Requires="a14">
+            <p:sp>
+              <p:nvSpPr>
+                <p:cNvPr id="141" name="Zone de texte 230"/>
+                <p:cNvSpPr txBox="1"/>
+                <p:nvPr/>
+              </p:nvSpPr>
+              <p:spPr>
+                <a:xfrm>
+                  <a:off x="3750285" y="3400324"/>
+                  <a:ext cx="301613" cy="274431"/>
+                </a:xfrm>
+                <a:prstGeom prst="rect">
+                  <a:avLst/>
+                </a:prstGeom>
+                <a:noFill/>
+                <a:ln w="6350">
+                  <a:noFill/>
+                </a:ln>
+                <a:effectLst/>
+              </p:spPr>
+              <p:style>
+                <a:lnRef idx="0">
+                  <a:schemeClr val="accent1"/>
+                </a:lnRef>
+                <a:fillRef idx="0">
+                  <a:schemeClr val="accent1"/>
+                </a:fillRef>
+                <a:effectRef idx="0">
+                  <a:schemeClr val="accent1"/>
+                </a:effectRef>
+                <a:fontRef idx="minor">
+                  <a:schemeClr val="dk1"/>
+                </a:fontRef>
+              </p:style>
+              <p:txBody>
+                <a:bodyPr rot="0" spcFirstLastPara="0" vert="horz" wrap="square" lIns="91440" tIns="45720" rIns="91440" bIns="45720" numCol="1" spcCol="0" rtlCol="0" fromWordArt="0" anchor="t" anchorCtr="0" forceAA="0" compatLnSpc="1">
+                  <a:prstTxWarp prst="textNoShape">
+                    <a:avLst/>
+                  </a:prstTxWarp>
+                  <a:noAutofit/>
+                </a:bodyPr>
+                <a:lstStyle/>
+                <a:p>
+                  <a:pPr>
+                    <a:lnSpc>
+                      <a:spcPct val="107000"/>
+                    </a:lnSpc>
+                    <a:spcAft>
+                      <a:spcPts val="800"/>
+                    </a:spcAft>
+                  </a:pPr>
+                  <a14:m>
+                    <m:oMathPara xmlns:m="http://schemas.openxmlformats.org/officeDocument/2006/math">
+                      <m:oMathParaPr>
+                        <m:jc m:val="centerGroup"/>
+                      </m:oMathParaPr>
+                      <m:oMath xmlns:m="http://schemas.openxmlformats.org/officeDocument/2006/math">
+                        <m:sSub>
+                          <m:sSubPr>
+                            <m:ctrlPr>
+                              <a:rPr lang="fr-FR" sz="1100" b="0" i="1" smtClean="0">
+                                <a:effectLst/>
+                                <a:latin typeface="Cambria Math" panose="02040503050406030204" pitchFamily="18" charset="0"/>
+                                <a:ea typeface="SimSun" panose="02010600030101010101" pitchFamily="2" charset="-122"/>
+                                <a:cs typeface="Times New Roman" panose="02020603050405020304" pitchFamily="18" charset="0"/>
+                              </a:rPr>
+                            </m:ctrlPr>
+                          </m:sSubPr>
+                          <m:e>
+                            <m:r>
+                              <a:rPr lang="fr-FR" sz="1100" b="0" i="1" smtClean="0">
+                                <a:effectLst/>
+                                <a:latin typeface="Cambria Math" panose="02040503050406030204" pitchFamily="18" charset="0"/>
+                                <a:ea typeface="SimSun" panose="02010600030101010101" pitchFamily="2" charset="-122"/>
+                                <a:cs typeface="Times New Roman" panose="02020603050405020304" pitchFamily="18" charset="0"/>
+                              </a:rPr>
+                              <m:t>𝐹</m:t>
+                            </m:r>
+                          </m:e>
+                          <m:sub>
+                            <m:r>
+                              <a:rPr lang="fr-FR" sz="1100" b="0" i="1" smtClean="0">
+                                <a:effectLst/>
+                                <a:latin typeface="Cambria Math" panose="02040503050406030204" pitchFamily="18" charset="0"/>
+                                <a:ea typeface="SimSun" panose="02010600030101010101" pitchFamily="2" charset="-122"/>
+                                <a:cs typeface="Times New Roman" panose="02020603050405020304" pitchFamily="18" charset="0"/>
+                              </a:rPr>
+                              <m:t>𝑈</m:t>
+                            </m:r>
+                          </m:sub>
+                        </m:sSub>
+                      </m:oMath>
+                    </m:oMathPara>
+                  </a14:m>
+                  <a:endParaRPr lang="fr-FR" sz="1100" dirty="0">
+                    <a:effectLst/>
+                    <a:ea typeface="SimSun" panose="02010600030101010101" pitchFamily="2" charset="-122"/>
+                    <a:cs typeface="Times New Roman" panose="02020603050405020304" pitchFamily="18" charset="0"/>
+                  </a:endParaRPr>
+                </a:p>
+              </p:txBody>
+            </p:sp>
+          </mc:Choice>
+          <mc:Fallback>
+            <p:sp>
+              <p:nvSpPr>
+                <p:cNvPr id="141" name="Zone de texte 230"/>
+                <p:cNvSpPr txBox="1">
+                  <a:spLocks noRot="1" noChangeAspect="1" noMove="1" noResize="1" noEditPoints="1" noAdjustHandles="1" noChangeArrowheads="1" noChangeShapeType="1" noTextEdit="1"/>
+                </p:cNvSpPr>
+                <p:nvPr/>
+              </p:nvSpPr>
+              <p:spPr>
+                <a:xfrm>
+                  <a:off x="3750285" y="3400324"/>
+                  <a:ext cx="301613" cy="274431"/>
+                </a:xfrm>
+                <a:prstGeom prst="rect">
+                  <a:avLst/>
+                </a:prstGeom>
+                <a:blipFill rotWithShape="0">
+                  <a:blip r:embed="rId4"/>
+                  <a:stretch>
+                    <a:fillRect/>
+                  </a:stretch>
+                </a:blipFill>
+                <a:ln w="6350">
+                  <a:noFill/>
+                </a:ln>
+                <a:effectLst/>
+              </p:spPr>
+              <p:txBody>
+                <a:bodyPr/>
+                <a:lstStyle/>
+                <a:p>
+                  <a:r>
+                    <a:rPr lang="fr-FR">
+                      <a:noFill/>
+                    </a:rPr>
+                    <a:t> </a:t>
+                  </a:r>
+                </a:p>
+              </p:txBody>
+            </p:sp>
+          </mc:Fallback>
+        </mc:AlternateContent>
+        <mc:AlternateContent xmlns:mc="http://schemas.openxmlformats.org/markup-compatibility/2006">
+          <mc:Choice xmlns:a14="http://schemas.microsoft.com/office/drawing/2010/main" Requires="a14">
+            <p:sp>
+              <p:nvSpPr>
+                <p:cNvPr id="142" name="Zone de texte 230"/>
+                <p:cNvSpPr txBox="1"/>
+                <p:nvPr/>
+              </p:nvSpPr>
+              <p:spPr>
+                <a:xfrm>
+                  <a:off x="6420034" y="3374241"/>
+                  <a:ext cx="301613" cy="274431"/>
+                </a:xfrm>
+                <a:prstGeom prst="rect">
+                  <a:avLst/>
+                </a:prstGeom>
+                <a:noFill/>
+                <a:ln w="6350">
+                  <a:noFill/>
+                </a:ln>
+                <a:effectLst/>
+              </p:spPr>
+              <p:style>
+                <a:lnRef idx="0">
+                  <a:schemeClr val="accent1"/>
+                </a:lnRef>
+                <a:fillRef idx="0">
+                  <a:schemeClr val="accent1"/>
+                </a:fillRef>
+                <a:effectRef idx="0">
+                  <a:schemeClr val="accent1"/>
+                </a:effectRef>
+                <a:fontRef idx="minor">
+                  <a:schemeClr val="dk1"/>
+                </a:fontRef>
+              </p:style>
+              <p:txBody>
+                <a:bodyPr rot="0" spcFirstLastPara="0" vert="horz" wrap="square" lIns="91440" tIns="45720" rIns="91440" bIns="45720" numCol="1" spcCol="0" rtlCol="0" fromWordArt="0" anchor="t" anchorCtr="0" forceAA="0" compatLnSpc="1">
+                  <a:prstTxWarp prst="textNoShape">
+                    <a:avLst/>
+                  </a:prstTxWarp>
+                  <a:noAutofit/>
+                </a:bodyPr>
+                <a:lstStyle/>
+                <a:p>
+                  <a:pPr>
+                    <a:lnSpc>
+                      <a:spcPct val="107000"/>
+                    </a:lnSpc>
+                    <a:spcAft>
+                      <a:spcPts val="800"/>
+                    </a:spcAft>
+                  </a:pPr>
+                  <a14:m>
+                    <m:oMathPara xmlns:m="http://schemas.openxmlformats.org/officeDocument/2006/math">
+                      <m:oMathParaPr>
+                        <m:jc m:val="centerGroup"/>
+                      </m:oMathParaPr>
+                      <m:oMath xmlns:m="http://schemas.openxmlformats.org/officeDocument/2006/math">
+                        <m:sSub>
+                          <m:sSubPr>
+                            <m:ctrlPr>
+                              <a:rPr lang="fr-FR" sz="1100" b="0" i="1" smtClean="0">
+                                <a:effectLst/>
+                                <a:latin typeface="Cambria Math" panose="02040503050406030204" pitchFamily="18" charset="0"/>
+                                <a:ea typeface="SimSun" panose="02010600030101010101" pitchFamily="2" charset="-122"/>
+                                <a:cs typeface="Times New Roman" panose="02020603050405020304" pitchFamily="18" charset="0"/>
+                              </a:rPr>
+                            </m:ctrlPr>
+                          </m:sSubPr>
+                          <m:e>
+                            <m:r>
+                              <a:rPr lang="fr-FR" sz="1100" b="0" i="1" smtClean="0">
+                                <a:effectLst/>
+                                <a:latin typeface="Cambria Math" panose="02040503050406030204" pitchFamily="18" charset="0"/>
+                                <a:ea typeface="SimSun" panose="02010600030101010101" pitchFamily="2" charset="-122"/>
+                                <a:cs typeface="Times New Roman" panose="02020603050405020304" pitchFamily="18" charset="0"/>
+                              </a:rPr>
+                              <m:t>𝐹</m:t>
+                            </m:r>
+                          </m:e>
+                          <m:sub>
+                            <m:r>
+                              <a:rPr lang="fr-FR" sz="1100" b="0" i="1" smtClean="0">
+                                <a:effectLst/>
+                                <a:latin typeface="Cambria Math" panose="02040503050406030204" pitchFamily="18" charset="0"/>
+                                <a:ea typeface="SimSun" panose="02010600030101010101" pitchFamily="2" charset="-122"/>
+                                <a:cs typeface="Times New Roman" panose="02020603050405020304" pitchFamily="18" charset="0"/>
+                              </a:rPr>
+                              <m:t>𝑈</m:t>
+                            </m:r>
+                          </m:sub>
+                        </m:sSub>
+                      </m:oMath>
+                    </m:oMathPara>
+                  </a14:m>
+                  <a:endParaRPr lang="fr-FR" sz="1100" dirty="0">
+                    <a:effectLst/>
+                    <a:ea typeface="SimSun" panose="02010600030101010101" pitchFamily="2" charset="-122"/>
+                    <a:cs typeface="Times New Roman" panose="02020603050405020304" pitchFamily="18" charset="0"/>
+                  </a:endParaRPr>
+                </a:p>
+              </p:txBody>
+            </p:sp>
+          </mc:Choice>
+          <mc:Fallback>
+            <p:sp>
+              <p:nvSpPr>
+                <p:cNvPr id="142" name="Zone de texte 230"/>
+                <p:cNvSpPr txBox="1">
+                  <a:spLocks noRot="1" noChangeAspect="1" noMove="1" noResize="1" noEditPoints="1" noAdjustHandles="1" noChangeArrowheads="1" noChangeShapeType="1" noTextEdit="1"/>
+                </p:cNvSpPr>
+                <p:nvPr/>
+              </p:nvSpPr>
+              <p:spPr>
+                <a:xfrm>
+                  <a:off x="6420034" y="3374241"/>
+                  <a:ext cx="301613" cy="274431"/>
+                </a:xfrm>
+                <a:prstGeom prst="rect">
+                  <a:avLst/>
+                </a:prstGeom>
+                <a:blipFill rotWithShape="0">
+                  <a:blip r:embed="rId4"/>
+                  <a:stretch>
+                    <a:fillRect/>
+                  </a:stretch>
+                </a:blipFill>
+                <a:ln w="6350">
+                  <a:noFill/>
+                </a:ln>
+                <a:effectLst/>
+              </p:spPr>
+              <p:txBody>
+                <a:bodyPr/>
+                <a:lstStyle/>
+                <a:p>
+                  <a:r>
+                    <a:rPr lang="fr-FR">
+                      <a:noFill/>
+                    </a:rPr>
+                    <a:t> </a:t>
+                  </a:r>
+                </a:p>
+              </p:txBody>
+            </p:sp>
+          </mc:Fallback>
+        </mc:AlternateContent>
+        <mc:AlternateContent xmlns:mc="http://schemas.openxmlformats.org/markup-compatibility/2006">
+          <mc:Choice xmlns:a14="http://schemas.microsoft.com/office/drawing/2010/main" Requires="a14">
+            <p:sp>
+              <p:nvSpPr>
+                <p:cNvPr id="143" name="Zone de texte 230"/>
+                <p:cNvSpPr txBox="1"/>
+                <p:nvPr/>
+              </p:nvSpPr>
+              <p:spPr>
+                <a:xfrm>
+                  <a:off x="7112104" y="642803"/>
+                  <a:ext cx="301613" cy="274431"/>
+                </a:xfrm>
+                <a:prstGeom prst="rect">
+                  <a:avLst/>
+                </a:prstGeom>
+                <a:noFill/>
+                <a:ln w="6350">
+                  <a:noFill/>
+                </a:ln>
+                <a:effectLst/>
+              </p:spPr>
+              <p:style>
+                <a:lnRef idx="0">
+                  <a:schemeClr val="accent1"/>
+                </a:lnRef>
+                <a:fillRef idx="0">
+                  <a:schemeClr val="accent1"/>
+                </a:fillRef>
+                <a:effectRef idx="0">
+                  <a:schemeClr val="accent1"/>
+                </a:effectRef>
+                <a:fontRef idx="minor">
+                  <a:schemeClr val="dk1"/>
+                </a:fontRef>
+              </p:style>
+              <p:txBody>
+                <a:bodyPr rot="0" spcFirstLastPara="0" vert="horz" wrap="square" lIns="91440" tIns="45720" rIns="91440" bIns="45720" numCol="1" spcCol="0" rtlCol="0" fromWordArt="0" anchor="t" anchorCtr="0" forceAA="0" compatLnSpc="1">
+                  <a:prstTxWarp prst="textNoShape">
+                    <a:avLst/>
+                  </a:prstTxWarp>
+                  <a:noAutofit/>
+                </a:bodyPr>
+                <a:lstStyle/>
+                <a:p>
+                  <a:pPr>
+                    <a:lnSpc>
+                      <a:spcPct val="107000"/>
+                    </a:lnSpc>
+                    <a:spcAft>
+                      <a:spcPts val="800"/>
+                    </a:spcAft>
+                  </a:pPr>
+                  <a14:m>
+                    <m:oMathPara xmlns:m="http://schemas.openxmlformats.org/officeDocument/2006/math">
+                      <m:oMathParaPr>
+                        <m:jc m:val="centerGroup"/>
+                      </m:oMathParaPr>
+                      <m:oMath xmlns:m="http://schemas.openxmlformats.org/officeDocument/2006/math">
+                        <m:sSub>
+                          <m:sSubPr>
+                            <m:ctrlPr>
+                              <a:rPr lang="fr-FR" sz="1100" b="0" i="1" smtClean="0">
+                                <a:effectLst/>
+                                <a:latin typeface="Cambria Math" panose="02040503050406030204" pitchFamily="18" charset="0"/>
+                                <a:ea typeface="SimSun" panose="02010600030101010101" pitchFamily="2" charset="-122"/>
+                                <a:cs typeface="Times New Roman" panose="02020603050405020304" pitchFamily="18" charset="0"/>
+                              </a:rPr>
+                            </m:ctrlPr>
+                          </m:sSubPr>
+                          <m:e>
+                            <m:r>
+                              <a:rPr lang="fr-FR" sz="1100" b="0" i="1" smtClean="0">
+                                <a:effectLst/>
+                                <a:latin typeface="Cambria Math" panose="02040503050406030204" pitchFamily="18" charset="0"/>
+                                <a:ea typeface="SimSun" panose="02010600030101010101" pitchFamily="2" charset="-122"/>
+                                <a:cs typeface="Times New Roman" panose="02020603050405020304" pitchFamily="18" charset="0"/>
+                              </a:rPr>
+                              <m:t>𝐹</m:t>
+                            </m:r>
+                          </m:e>
+                          <m:sub>
+                            <m:r>
+                              <a:rPr lang="fr-FR" sz="1100" b="0" i="1" smtClean="0">
+                                <a:effectLst/>
+                                <a:latin typeface="Cambria Math" panose="02040503050406030204" pitchFamily="18" charset="0"/>
+                                <a:ea typeface="SimSun" panose="02010600030101010101" pitchFamily="2" charset="-122"/>
+                                <a:cs typeface="Times New Roman" panose="02020603050405020304" pitchFamily="18" charset="0"/>
+                              </a:rPr>
+                              <m:t>𝑈</m:t>
+                            </m:r>
+                          </m:sub>
+                        </m:sSub>
+                      </m:oMath>
+                    </m:oMathPara>
+                  </a14:m>
+                  <a:endParaRPr lang="fr-FR" sz="1100" dirty="0">
+                    <a:effectLst/>
+                    <a:ea typeface="SimSun" panose="02010600030101010101" pitchFamily="2" charset="-122"/>
+                    <a:cs typeface="Times New Roman" panose="02020603050405020304" pitchFamily="18" charset="0"/>
+                  </a:endParaRPr>
+                </a:p>
+              </p:txBody>
+            </p:sp>
+          </mc:Choice>
+          <mc:Fallback>
+            <p:sp>
+              <p:nvSpPr>
+                <p:cNvPr id="143" name="Zone de texte 230"/>
+                <p:cNvSpPr txBox="1">
+                  <a:spLocks noRot="1" noChangeAspect="1" noMove="1" noResize="1" noEditPoints="1" noAdjustHandles="1" noChangeArrowheads="1" noChangeShapeType="1" noTextEdit="1"/>
+                </p:cNvSpPr>
+                <p:nvPr/>
+              </p:nvSpPr>
+              <p:spPr>
+                <a:xfrm>
+                  <a:off x="7112104" y="642803"/>
+                  <a:ext cx="301613" cy="274431"/>
+                </a:xfrm>
+                <a:prstGeom prst="rect">
+                  <a:avLst/>
+                </a:prstGeom>
+                <a:blipFill rotWithShape="0">
+                  <a:blip r:embed="rId3"/>
+                  <a:stretch>
+                    <a:fillRect/>
+                  </a:stretch>
+                </a:blipFill>
+                <a:ln w="6350">
+                  <a:noFill/>
+                </a:ln>
+                <a:effectLst/>
+              </p:spPr>
+              <p:txBody>
+                <a:bodyPr/>
+                <a:lstStyle/>
+                <a:p>
+                  <a:r>
+                    <a:rPr lang="fr-FR">
+                      <a:noFill/>
+                    </a:rPr>
+                    <a:t> </a:t>
+                  </a:r>
+                </a:p>
+              </p:txBody>
+            </p:sp>
+          </mc:Fallback>
+        </mc:AlternateContent>
+        <p:sp>
+          <p:nvSpPr>
+            <p:cNvPr id="144" name="Rectangle 143"/>
+            <p:cNvSpPr/>
+            <p:nvPr/>
+          </p:nvSpPr>
+          <p:spPr>
+            <a:xfrm rot="2630184">
+              <a:off x="4558301" y="1426902"/>
+              <a:ext cx="203937" cy="120483"/>
+            </a:xfrm>
+            <a:prstGeom prst="rect">
+              <a:avLst/>
+            </a:prstGeom>
+          </p:spPr>
+          <p:style>
+            <a:lnRef idx="2">
+              <a:schemeClr val="dk1">
+                <a:shade val="50000"/>
+              </a:schemeClr>
+            </a:lnRef>
+            <a:fillRef idx="1">
+              <a:schemeClr val="dk1"/>
+            </a:fillRef>
+            <a:effectRef idx="0">
+              <a:schemeClr val="dk1"/>
+            </a:effectRef>
+            <a:fontRef idx="minor">
+              <a:schemeClr val="lt1"/>
+            </a:fontRef>
+          </p:style>
+          <p:txBody>
+            <a:bodyPr rtlCol="0" anchor="ctr"/>
+            <a:lstStyle/>
+            <a:p>
+              <a:pPr algn="ctr"/>
+              <a:endParaRPr lang="fr-FR"/>
+            </a:p>
+          </p:txBody>
+        </p:sp>
+        <p:sp>
+          <p:nvSpPr>
+            <p:cNvPr id="145" name="Rectangle 144"/>
+            <p:cNvSpPr/>
+            <p:nvPr/>
+          </p:nvSpPr>
+          <p:spPr>
+            <a:xfrm rot="3022879">
+              <a:off x="6293377" y="3114023"/>
+              <a:ext cx="203937" cy="117948"/>
+            </a:xfrm>
+            <a:prstGeom prst="rect">
+              <a:avLst/>
+            </a:prstGeom>
+          </p:spPr>
+          <p:style>
+            <a:lnRef idx="2">
+              <a:schemeClr val="dk1">
+                <a:shade val="50000"/>
+              </a:schemeClr>
+            </a:lnRef>
+            <a:fillRef idx="1">
+              <a:schemeClr val="dk1"/>
+            </a:fillRef>
+            <a:effectRef idx="0">
+              <a:schemeClr val="dk1"/>
+            </a:effectRef>
+            <a:fontRef idx="minor">
+              <a:schemeClr val="lt1"/>
+            </a:fontRef>
+          </p:style>
+          <p:txBody>
+            <a:bodyPr rtlCol="0" anchor="ctr"/>
+            <a:lstStyle/>
+            <a:p>
+              <a:pPr algn="ctr"/>
+              <a:endParaRPr lang="fr-FR"/>
+            </a:p>
+          </p:txBody>
+        </p:sp>
+        <p:sp>
+          <p:nvSpPr>
+            <p:cNvPr id="147" name="Rectangle 146"/>
+            <p:cNvSpPr/>
+            <p:nvPr/>
+          </p:nvSpPr>
+          <p:spPr>
+            <a:xfrm rot="8111126">
+              <a:off x="4203365" y="3384280"/>
+              <a:ext cx="203937" cy="117948"/>
+            </a:xfrm>
+            <a:prstGeom prst="rect">
+              <a:avLst/>
+            </a:prstGeom>
+          </p:spPr>
+          <p:style>
+            <a:lnRef idx="2">
+              <a:schemeClr val="dk1">
+                <a:shade val="50000"/>
+              </a:schemeClr>
+            </a:lnRef>
+            <a:fillRef idx="1">
+              <a:schemeClr val="dk1"/>
+            </a:fillRef>
+            <a:effectRef idx="0">
+              <a:schemeClr val="dk1"/>
+            </a:effectRef>
+            <a:fontRef idx="minor">
+              <a:schemeClr val="lt1"/>
+            </a:fontRef>
+          </p:style>
+          <p:txBody>
+            <a:bodyPr rtlCol="0" anchor="ctr"/>
+            <a:lstStyle/>
+            <a:p>
+              <a:pPr algn="ctr"/>
+              <a:endParaRPr lang="fr-FR"/>
+            </a:p>
+          </p:txBody>
+        </p:sp>
+        <p:sp>
+          <p:nvSpPr>
+            <p:cNvPr id="148" name="Rectangle 147"/>
+            <p:cNvSpPr/>
+            <p:nvPr/>
+          </p:nvSpPr>
+          <p:spPr>
+            <a:xfrm rot="19215307">
+              <a:off x="6890577" y="1104806"/>
+              <a:ext cx="203937" cy="117948"/>
+            </a:xfrm>
+            <a:prstGeom prst="rect">
+              <a:avLst/>
+            </a:prstGeom>
+          </p:spPr>
+          <p:style>
+            <a:lnRef idx="2">
+              <a:schemeClr val="dk1">
+                <a:shade val="50000"/>
+              </a:schemeClr>
+            </a:lnRef>
+            <a:fillRef idx="1">
+              <a:schemeClr val="dk1"/>
+            </a:fillRef>
+            <a:effectRef idx="0">
+              <a:schemeClr val="dk1"/>
+            </a:effectRef>
+            <a:fontRef idx="minor">
+              <a:schemeClr val="lt1"/>
+            </a:fontRef>
+          </p:style>
+          <p:txBody>
+            <a:bodyPr rtlCol="0" anchor="ctr"/>
+            <a:lstStyle/>
+            <a:p>
+              <a:pPr algn="ctr"/>
+              <a:endParaRPr lang="fr-FR"/>
+            </a:p>
+          </p:txBody>
+        </p:sp>
+        <p:sp>
+          <p:nvSpPr>
+            <p:cNvPr id="149" name="ZoneTexte 148"/>
+            <p:cNvSpPr txBox="1"/>
+            <p:nvPr/>
+          </p:nvSpPr>
+          <p:spPr>
+            <a:xfrm>
+              <a:off x="3428888" y="763345"/>
+              <a:ext cx="876445" cy="307777"/>
+            </a:xfrm>
+            <a:prstGeom prst="rect">
+              <a:avLst/>
+            </a:prstGeom>
+            <a:noFill/>
+          </p:spPr>
+          <p:txBody>
+            <a:bodyPr wrap="square" rtlCol="0">
+              <a:spAutoFit/>
+            </a:bodyPr>
+            <a:lstStyle/>
+            <a:p>
+              <a:pPr algn="ctr"/>
+              <a:r>
+                <a:rPr lang="fr-FR" sz="1400" dirty="0" smtClean="0"/>
+                <a:t>Balourd</a:t>
+              </a:r>
+              <a:endParaRPr lang="fr-FR" sz="1400" dirty="0"/>
+            </a:p>
+          </p:txBody>
+        </p:sp>
+        <p:cxnSp>
+          <p:nvCxnSpPr>
+            <p:cNvPr id="150" name="Connecteur en arc 149"/>
+            <p:cNvCxnSpPr>
+              <a:stCxn id="149" idx="3"/>
+              <a:endCxn id="51" idx="5"/>
+            </p:cNvCxnSpPr>
+            <p:nvPr/>
+          </p:nvCxnSpPr>
+          <p:spPr>
+            <a:xfrm>
+              <a:off x="4305333" y="917234"/>
+              <a:ext cx="387809" cy="511200"/>
+            </a:xfrm>
+            <a:prstGeom prst="curvedConnector2">
+              <a:avLst/>
+            </a:prstGeom>
+            <a:ln>
+              <a:tailEnd type="triangle"/>
+            </a:ln>
+          </p:spPr>
+          <p:style>
+            <a:lnRef idx="1">
+              <a:schemeClr val="dk1"/>
+            </a:lnRef>
+            <a:fillRef idx="0">
+              <a:schemeClr val="dk1"/>
+            </a:fillRef>
+            <a:effectRef idx="0">
+              <a:schemeClr val="dk1"/>
+            </a:effectRef>
+            <a:fontRef idx="minor">
+              <a:schemeClr val="tx1"/>
+            </a:fontRef>
+          </p:style>
+        </p:cxnSp>
+      </p:grpSp>
+    </p:spTree>
+    <p:extLst>
+      <p:ext uri="{BB962C8B-B14F-4D97-AF65-F5344CB8AC3E}">
+        <p14:creationId xmlns:p14="http://schemas.microsoft.com/office/powerpoint/2010/main" val="2073373596"/>
+      </p:ext>
+    </p:extLst>
+  </p:cSld>
+  <p:clrMapOvr>
+    <a:masterClrMapping/>
+  </p:clrMapOvr>
+</p:sld>
+</file>
+
 <file path=ppt/theme/theme1.xml><?xml version="1.0" encoding="utf-8"?>
 <a:theme xmlns:a="http://schemas.openxmlformats.org/drawingml/2006/main" name="Thème Office">
   <a:themeElements>

</xml_diff>